<commit_message>
Update ppt background anh fonts
</commit_message>
<xml_diff>
--- a/2018-2019結業禮.pptx
+++ b/2018-2019結業禮.pptx
@@ -3039,7 +3039,7 @@
           </a:blip>
           <a:srcRect/>
           <a:stretch>
-            <a:fillRect l="-6000" r="-6000"/>
+            <a:fillRect t="-9000" b="-9000"/>
           </a:stretch>
         </a:blipFill>
         <a:effectLst/>
@@ -3071,8 +3071,8 @@
         </p:nvSpPr>
         <p:spPr>
           <a:xfrm>
-            <a:off x="762000" y="30029"/>
-            <a:ext cx="7772400" cy="865322"/>
+            <a:off x="0" y="30029"/>
+            <a:ext cx="9144000" cy="865322"/>
           </a:xfrm>
         </p:spPr>
         <p:txBody>
@@ -3082,7 +3082,7 @@
             <a:r>
               <a:rPr lang="zh-CN" altLang="en-US" b="1" dirty="0" smtClean="0">
                 <a:solidFill>
-                  <a:srgbClr val="59D41C"/>
+                  <a:srgbClr val="FFFF00"/>
                 </a:solidFill>
                 <a:effectLst>
                   <a:outerShdw blurRad="38100" dist="38100" dir="2700000" algn="tl">
@@ -3098,7 +3098,7 @@
             </a:r>
             <a:endParaRPr lang="en-US" b="1" dirty="0">
               <a:solidFill>
-                <a:srgbClr val="59D41C"/>
+                <a:srgbClr val="FFFF00"/>
               </a:solidFill>
               <a:effectLst>
                 <a:outerShdw blurRad="38100" dist="38100" dir="2700000" algn="tl">
@@ -3125,8 +3125,8 @@
         </p:nvSpPr>
         <p:spPr>
           <a:xfrm>
-            <a:off x="1371600" y="971550"/>
-            <a:ext cx="6400800" cy="533400"/>
+            <a:off x="-9041" y="1123950"/>
+            <a:ext cx="9144000" cy="533400"/>
           </a:xfrm>
         </p:spPr>
         <p:txBody>
@@ -3137,9 +3137,22 @@
           <a:p>
             <a:r>
               <a:rPr lang="en-US" altLang="zh-CN" b="1" dirty="0" smtClean="0">
+                <a:ln w="19050">
+                  <a:solidFill>
+                    <a:srgbClr val="002060"/>
+                  </a:solidFill>
+                </a:ln>
                 <a:solidFill>
-                  <a:srgbClr val="0070C0"/>
+                  <a:srgbClr val="8FF92F"/>
                 </a:solidFill>
+                <a:effectLst>
+                  <a:glow rad="228600">
+                    <a:schemeClr val="accent5">
+                      <a:satMod val="175000"/>
+                      <a:alpha val="40000"/>
+                    </a:schemeClr>
+                  </a:glow>
+                </a:effectLst>
                 <a:latin typeface="Microsoft JhengHei" pitchFamily="34" charset="-120"/>
                 <a:ea typeface="Microsoft JhengHei" pitchFamily="34" charset="-120"/>
               </a:rPr>
@@ -3147,18 +3160,44 @@
             </a:r>
             <a:r>
               <a:rPr lang="zh-CN" altLang="en-US" b="1" dirty="0" smtClean="0">
+                <a:ln w="19050">
+                  <a:solidFill>
+                    <a:srgbClr val="002060"/>
+                  </a:solidFill>
+                </a:ln>
                 <a:solidFill>
-                  <a:srgbClr val="0070C0"/>
+                  <a:srgbClr val="8FF92F"/>
                 </a:solidFill>
+                <a:effectLst>
+                  <a:glow rad="228600">
+                    <a:schemeClr val="accent5">
+                      <a:satMod val="175000"/>
+                      <a:alpha val="40000"/>
+                    </a:schemeClr>
+                  </a:glow>
+                </a:effectLst>
                 <a:latin typeface="Microsoft JhengHei" pitchFamily="34" charset="-120"/>
                 <a:ea typeface="Microsoft JhengHei" pitchFamily="34" charset="-120"/>
               </a:rPr>
               <a:t>年度</a:t>
             </a:r>
             <a:endParaRPr lang="en-US" b="1" dirty="0">
+              <a:ln w="19050">
+                <a:solidFill>
+                  <a:srgbClr val="002060"/>
+                </a:solidFill>
+              </a:ln>
               <a:solidFill>
-                <a:srgbClr val="0070C0"/>
+                <a:srgbClr val="8FF92F"/>
               </a:solidFill>
+              <a:effectLst>
+                <a:glow rad="228600">
+                  <a:schemeClr val="accent5">
+                    <a:satMod val="175000"/>
+                    <a:alpha val="40000"/>
+                  </a:schemeClr>
+                </a:glow>
+              </a:effectLst>
               <a:latin typeface="Microsoft JhengHei" pitchFamily="34" charset="-120"/>
               <a:ea typeface="Microsoft JhengHei" pitchFamily="34" charset="-120"/>
             </a:endParaRPr>
@@ -3175,8 +3214,8 @@
         </p:nvSpPr>
         <p:spPr>
           <a:xfrm>
-            <a:off x="685800" y="1648632"/>
-            <a:ext cx="7772400" cy="1102519"/>
+            <a:off x="0" y="2038349"/>
+            <a:ext cx="9144000" cy="1102519"/>
           </a:xfrm>
           <a:prstGeom prst="rect">
             <a:avLst/>
@@ -3205,10 +3244,21 @@
           <a:p>
             <a:r>
               <a:rPr lang="zh-CN" altLang="en-US" sz="6600" b="1" dirty="0" smtClean="0">
+                <a:ln w="19050">
+                  <a:solidFill>
+                    <a:srgbClr val="FFFF00"/>
+                  </a:solidFill>
+                </a:ln>
                 <a:solidFill>
                   <a:srgbClr val="FF0000"/>
                 </a:solidFill>
                 <a:effectLst>
+                  <a:glow rad="63500">
+                    <a:schemeClr val="accent3">
+                      <a:satMod val="175000"/>
+                      <a:alpha val="40000"/>
+                    </a:schemeClr>
+                  </a:glow>
                   <a:outerShdw blurRad="38100" dist="38100" dir="2700000" algn="tl">
                     <a:srgbClr val="000000">
                       <a:alpha val="43137"/>
@@ -3221,10 +3271,21 @@
               <a:t>結業禮</a:t>
             </a:r>
             <a:endParaRPr lang="en-US" sz="6600" b="1" dirty="0">
+              <a:ln w="19050">
+                <a:solidFill>
+                  <a:srgbClr val="FFFF00"/>
+                </a:solidFill>
+              </a:ln>
               <a:solidFill>
                 <a:srgbClr val="FF0000"/>
               </a:solidFill>
               <a:effectLst>
+                <a:glow rad="63500">
+                  <a:schemeClr val="accent3">
+                    <a:satMod val="175000"/>
+                    <a:alpha val="40000"/>
+                  </a:schemeClr>
+                </a:glow>
                 <a:outerShdw blurRad="38100" dist="38100" dir="2700000" algn="tl">
                   <a:srgbClr val="000000">
                     <a:alpha val="43137"/>

</xml_diff>

<commit_message>
Update song lyric and background
</commit_message>
<xml_diff>
--- a/2018-2019結業禮.pptx
+++ b/2018-2019結業禮.pptx
@@ -6,7 +6,8 @@
   </p:sldMasterIdLst>
   <p:sldIdLst>
     <p:sldId id="256" r:id="rId2"/>
-    <p:sldId id="257" r:id="rId3"/>
+    <p:sldId id="258" r:id="rId3"/>
+    <p:sldId id="257" r:id="rId4"/>
   </p:sldIdLst>
   <p:sldSz cx="9144000" cy="5143500" type="screen16x9"/>
   <p:notesSz cx="6858000" cy="9144000"/>
@@ -3035,6 +3036,7 @@
       <p:bgPr>
         <a:blipFill dpi="0" rotWithShape="1">
           <a:blip r:embed="rId2">
+            <a:alphaModFix amt="82000"/>
             <a:lum/>
           </a:blip>
           <a:srcRect/>
@@ -3071,18 +3073,26 @@
         </p:nvSpPr>
         <p:spPr>
           <a:xfrm>
-            <a:off x="0" y="30029"/>
+            <a:off x="0" y="209550"/>
             <a:ext cx="9144000" cy="865322"/>
           </a:xfrm>
         </p:spPr>
         <p:txBody>
-          <a:bodyPr/>
-          <a:lstStyle/>
-          <a:p>
+          <a:bodyPr>
+            <a:normAutofit/>
+          </a:bodyPr>
+          <a:lstStyle/>
+          <a:p>
+            <a:pPr algn="l"/>
             <a:r>
               <a:rPr lang="zh-CN" altLang="en-US" b="1" dirty="0" smtClean="0">
-                <a:solidFill>
-                  <a:srgbClr val="FFFF00"/>
+                <a:ln w="12700">
+                  <a:solidFill>
+                    <a:srgbClr val="FFFF00"/>
+                  </a:solidFill>
+                </a:ln>
+                <a:solidFill>
+                  <a:srgbClr val="FF0000"/>
                 </a:solidFill>
                 <a:effectLst>
                   <a:outerShdw blurRad="38100" dist="38100" dir="2700000" algn="tl">
@@ -3094,11 +3104,38 @@
                 <a:latin typeface="Microsoft JhengHei" pitchFamily="34" charset="-120"/>
                 <a:ea typeface="Microsoft JhengHei" pitchFamily="34" charset="-120"/>
               </a:rPr>
-              <a:t>宣道會梁汝學堂主日學</a:t>
+              <a:t>  宣</a:t>
+            </a:r>
+            <a:r>
+              <a:rPr lang="zh-CN" altLang="en-US" b="1" dirty="0" smtClean="0">
+                <a:ln w="12700">
+                  <a:solidFill>
+                    <a:srgbClr val="FFFF00"/>
+                  </a:solidFill>
+                </a:ln>
+                <a:solidFill>
+                  <a:srgbClr val="FF0000"/>
+                </a:solidFill>
+                <a:effectLst>
+                  <a:outerShdw blurRad="38100" dist="38100" dir="2700000" algn="tl">
+                    <a:srgbClr val="000000">
+                      <a:alpha val="43137"/>
+                    </a:srgbClr>
+                  </a:outerShdw>
+                </a:effectLst>
+                <a:latin typeface="Microsoft JhengHei" pitchFamily="34" charset="-120"/>
+                <a:ea typeface="Microsoft JhengHei" pitchFamily="34" charset="-120"/>
+              </a:rPr>
+              <a:t>道會梁汝學堂主日學</a:t>
             </a:r>
             <a:endParaRPr lang="en-US" b="1" dirty="0">
+              <a:ln w="12700">
+                <a:solidFill>
+                  <a:srgbClr val="FFFF00"/>
+                </a:solidFill>
+              </a:ln>
               <a:solidFill>
-                <a:srgbClr val="FFFF00"/>
+                <a:srgbClr val="FF0000"/>
               </a:solidFill>
               <a:effectLst>
                 <a:outerShdw blurRad="38100" dist="38100" dir="2700000" algn="tl">
@@ -3125,28 +3162,31 @@
         </p:nvSpPr>
         <p:spPr>
           <a:xfrm>
-            <a:off x="-9041" y="1123950"/>
+            <a:off x="0" y="3409950"/>
             <a:ext cx="9144000" cy="533400"/>
           </a:xfrm>
         </p:spPr>
         <p:txBody>
           <a:bodyPr>
-            <a:normAutofit lnSpcReduction="10000"/>
+            <a:noAutofit/>
           </a:bodyPr>
           <a:lstStyle/>
           <a:p>
-            <a:r>
-              <a:rPr lang="en-US" altLang="zh-CN" b="1" dirty="0" smtClean="0">
+            <a:pPr algn="l"/>
+            <a:r>
+              <a:rPr lang="en-US" altLang="zh-CN" sz="3600" b="1" dirty="0" smtClean="0">
                 <a:ln w="19050">
                   <a:solidFill>
                     <a:srgbClr val="002060"/>
                   </a:solidFill>
                 </a:ln>
                 <a:solidFill>
-                  <a:srgbClr val="8FF92F"/>
+                  <a:schemeClr val="tx2">
+                    <a:lumMod val="50000"/>
+                  </a:schemeClr>
                 </a:solidFill>
                 <a:effectLst>
-                  <a:glow rad="228600">
+                  <a:glow rad="101600">
                     <a:schemeClr val="accent5">
                       <a:satMod val="175000"/>
                       <a:alpha val="40000"/>
@@ -3156,20 +3196,47 @@
                 <a:latin typeface="Microsoft JhengHei" pitchFamily="34" charset="-120"/>
                 <a:ea typeface="Microsoft JhengHei" pitchFamily="34" charset="-120"/>
               </a:rPr>
-              <a:t>2018 -2019 </a:t>
-            </a:r>
-            <a:r>
-              <a:rPr lang="zh-CN" altLang="en-US" b="1" dirty="0" smtClean="0">
+              <a:t>	   2018 </a:t>
+            </a:r>
+            <a:r>
+              <a:rPr lang="en-US" altLang="zh-CN" sz="3600" b="1" dirty="0" smtClean="0">
                 <a:ln w="19050">
                   <a:solidFill>
                     <a:srgbClr val="002060"/>
                   </a:solidFill>
                 </a:ln>
                 <a:solidFill>
-                  <a:srgbClr val="8FF92F"/>
+                  <a:schemeClr val="tx2">
+                    <a:lumMod val="50000"/>
+                  </a:schemeClr>
                 </a:solidFill>
                 <a:effectLst>
-                  <a:glow rad="228600">
+                  <a:glow rad="101600">
+                    <a:schemeClr val="accent5">
+                      <a:satMod val="175000"/>
+                      <a:alpha val="40000"/>
+                    </a:schemeClr>
+                  </a:glow>
+                </a:effectLst>
+                <a:latin typeface="Microsoft JhengHei" pitchFamily="34" charset="-120"/>
+                <a:ea typeface="Microsoft JhengHei" pitchFamily="34" charset="-120"/>
+              </a:rPr>
+              <a:t>-2019 </a:t>
+            </a:r>
+            <a:r>
+              <a:rPr lang="zh-CN" altLang="en-US" sz="3600" b="1" dirty="0" smtClean="0">
+                <a:ln w="19050">
+                  <a:solidFill>
+                    <a:srgbClr val="002060"/>
+                  </a:solidFill>
+                </a:ln>
+                <a:solidFill>
+                  <a:schemeClr val="tx2">
+                    <a:lumMod val="50000"/>
+                  </a:schemeClr>
+                </a:solidFill>
+                <a:effectLst>
+                  <a:glow rad="101600">
                     <a:schemeClr val="accent5">
                       <a:satMod val="175000"/>
                       <a:alpha val="40000"/>
@@ -3181,17 +3248,19 @@
               </a:rPr>
               <a:t>年度</a:t>
             </a:r>
-            <a:endParaRPr lang="en-US" b="1" dirty="0">
+            <a:endParaRPr lang="en-US" sz="3600" b="1" dirty="0">
               <a:ln w="19050">
                 <a:solidFill>
                   <a:srgbClr val="002060"/>
                 </a:solidFill>
               </a:ln>
               <a:solidFill>
-                <a:srgbClr val="8FF92F"/>
+                <a:schemeClr val="tx2">
+                  <a:lumMod val="50000"/>
+                </a:schemeClr>
               </a:solidFill>
               <a:effectLst>
-                <a:glow rad="228600">
+                <a:glow rad="101600">
                   <a:schemeClr val="accent5">
                     <a:satMod val="175000"/>
                     <a:alpha val="40000"/>
@@ -3214,7 +3283,7 @@
         </p:nvSpPr>
         <p:spPr>
           <a:xfrm>
-            <a:off x="0" y="2038349"/>
+            <a:off x="0" y="4061968"/>
             <a:ext cx="9144000" cy="1102519"/>
           </a:xfrm>
           <a:prstGeom prst="rect">
@@ -3242,6 +3311,7 @@
             </a:lvl1pPr>
           </a:lstStyle>
           <a:p>
+            <a:pPr algn="l"/>
             <a:r>
               <a:rPr lang="zh-CN" altLang="en-US" sz="6600" b="1" dirty="0" smtClean="0">
                 <a:ln w="19050">
@@ -3268,7 +3338,119 @@
                 <a:latin typeface="Microsoft JhengHei" pitchFamily="34" charset="-120"/>
                 <a:ea typeface="Microsoft JhengHei" pitchFamily="34" charset="-120"/>
               </a:rPr>
-              <a:t>結業禮</a:t>
+              <a:t>     </a:t>
+            </a:r>
+            <a:r>
+              <a:rPr lang="en-US" altLang="zh-CN" sz="6600" b="1" dirty="0">
+                <a:ln w="19050">
+                  <a:solidFill>
+                    <a:srgbClr val="FFFF00"/>
+                  </a:solidFill>
+                </a:ln>
+                <a:solidFill>
+                  <a:srgbClr val="FF0000"/>
+                </a:solidFill>
+                <a:effectLst>
+                  <a:glow rad="63500">
+                    <a:schemeClr val="accent3">
+                      <a:satMod val="175000"/>
+                      <a:alpha val="40000"/>
+                    </a:schemeClr>
+                  </a:glow>
+                  <a:outerShdw blurRad="38100" dist="38100" dir="2700000" algn="tl">
+                    <a:srgbClr val="000000">
+                      <a:alpha val="43137"/>
+                    </a:srgbClr>
+                  </a:outerShdw>
+                </a:effectLst>
+                <a:latin typeface="Microsoft JhengHei" pitchFamily="34" charset="-120"/>
+                <a:ea typeface="Microsoft JhengHei" pitchFamily="34" charset="-120"/>
+              </a:rPr>
+              <a:t> </a:t>
+            </a:r>
+            <a:r>
+              <a:rPr lang="en-US" altLang="zh-CN" sz="6600" b="1" dirty="0" smtClean="0">
+                <a:ln w="19050">
+                  <a:solidFill>
+                    <a:srgbClr val="FFFF00"/>
+                  </a:solidFill>
+                </a:ln>
+                <a:solidFill>
+                  <a:srgbClr val="FF0000"/>
+                </a:solidFill>
+                <a:effectLst>
+                  <a:glow rad="63500">
+                    <a:schemeClr val="accent3">
+                      <a:satMod val="175000"/>
+                      <a:alpha val="40000"/>
+                    </a:schemeClr>
+                  </a:glow>
+                  <a:outerShdw blurRad="38100" dist="38100" dir="2700000" algn="tl">
+                    <a:srgbClr val="000000">
+                      <a:alpha val="43137"/>
+                    </a:srgbClr>
+                  </a:outerShdw>
+                </a:effectLst>
+                <a:latin typeface="Microsoft JhengHei" pitchFamily="34" charset="-120"/>
+                <a:ea typeface="Microsoft JhengHei" pitchFamily="34" charset="-120"/>
+              </a:rPr>
+              <a:t>  </a:t>
+            </a:r>
+            <a:r>
+              <a:rPr lang="zh-CN" altLang="en-US" sz="6600" b="1" dirty="0" smtClean="0">
+                <a:ln w="19050">
+                  <a:solidFill>
+                    <a:srgbClr val="FFFF00"/>
+                  </a:solidFill>
+                </a:ln>
+                <a:solidFill>
+                  <a:srgbClr val="FF0000"/>
+                </a:solidFill>
+                <a:effectLst>
+                  <a:glow rad="63500">
+                    <a:schemeClr val="accent3">
+                      <a:satMod val="175000"/>
+                      <a:alpha val="40000"/>
+                    </a:schemeClr>
+                  </a:glow>
+                  <a:outerShdw blurRad="38100" dist="38100" dir="2700000" algn="tl">
+                    <a:srgbClr val="000000">
+                      <a:alpha val="43137"/>
+                    </a:srgbClr>
+                  </a:outerShdw>
+                </a:effectLst>
+                <a:latin typeface="Microsoft JhengHei" pitchFamily="34" charset="-120"/>
+                <a:ea typeface="Microsoft JhengHei" pitchFamily="34" charset="-120"/>
+              </a:rPr>
+              <a:t>結</a:t>
+            </a:r>
+            <a:r>
+              <a:rPr lang="zh-CN" altLang="en-US" sz="6600" b="1" dirty="0" smtClean="0">
+                <a:ln w="19050">
+                  <a:solidFill>
+                    <a:srgbClr val="FFFF00"/>
+                  </a:solidFill>
+                </a:ln>
+                <a:solidFill>
+                  <a:srgbClr val="FF0000"/>
+                </a:solidFill>
+                <a:effectLst>
+                  <a:glow rad="63500">
+                    <a:schemeClr val="accent3">
+                      <a:satMod val="175000"/>
+                      <a:alpha val="40000"/>
+                    </a:schemeClr>
+                  </a:glow>
+                  <a:outerShdw blurRad="38100" dist="38100" dir="2700000" algn="tl">
+                    <a:srgbClr val="000000">
+                      <a:alpha val="43137"/>
+                    </a:srgbClr>
+                  </a:outerShdw>
+                </a:effectLst>
+                <a:latin typeface="Microsoft JhengHei" pitchFamily="34" charset="-120"/>
+                <a:ea typeface="Microsoft JhengHei" pitchFamily="34" charset="-120"/>
+              </a:rPr>
+              <a:t>業禮</a:t>
             </a:r>
             <a:endParaRPr lang="en-US" sz="6600" b="1" dirty="0">
               <a:ln w="19050">
@@ -3319,6 +3501,481 @@
 </file>
 
 <file path=ppt/slides/slide2.xml><?xml version="1.0" encoding="utf-8"?>
+<p:sld xmlns:a="http://schemas.openxmlformats.org/drawingml/2006/main" xmlns:r="http://schemas.openxmlformats.org/officeDocument/2006/relationships" xmlns:p="http://schemas.openxmlformats.org/presentationml/2006/main">
+  <p:cSld>
+    <p:bg>
+      <p:bgPr>
+        <a:blipFill dpi="0" rotWithShape="1">
+          <a:blip r:embed="rId2">
+            <a:alphaModFix amt="36000"/>
+            <a:lum/>
+          </a:blip>
+          <a:srcRect/>
+          <a:stretch>
+            <a:fillRect t="-9000" b="-9000"/>
+          </a:stretch>
+        </a:blipFill>
+        <a:effectLst/>
+      </p:bgPr>
+    </p:bg>
+    <p:spTree>
+      <p:nvGrpSpPr>
+        <p:cNvPr id="1" name=""/>
+        <p:cNvGrpSpPr/>
+        <p:nvPr/>
+      </p:nvGrpSpPr>
+      <p:grpSpPr>
+        <a:xfrm>
+          <a:off x="0" y="0"/>
+          <a:ext cx="0" cy="0"/>
+          <a:chOff x="0" y="0"/>
+          <a:chExt cx="0" cy="0"/>
+        </a:xfrm>
+      </p:grpSpPr>
+      <p:sp>
+        <p:nvSpPr>
+          <p:cNvPr id="4" name="Title 1"/>
+          <p:cNvSpPr txBox="1">
+            <a:spLocks/>
+          </p:cNvSpPr>
+          <p:nvPr/>
+        </p:nvSpPr>
+        <p:spPr>
+          <a:xfrm>
+            <a:off x="457200" y="133350"/>
+            <a:ext cx="8229600" cy="857250"/>
+          </a:xfrm>
+          <a:prstGeom prst="rect">
+            <a:avLst/>
+          </a:prstGeom>
+        </p:spPr>
+        <p:txBody>
+          <a:bodyPr vert="horz" lIns="91440" tIns="45720" rIns="91440" bIns="45720" rtlCol="0" anchor="ctr">
+            <a:normAutofit/>
+          </a:bodyPr>
+          <a:lstStyle>
+            <a:lvl1pPr algn="ctr" defTabSz="914400" rtl="0" eaLnBrk="1" latinLnBrk="0" hangingPunct="1">
+              <a:spcBef>
+                <a:spcPct val="0"/>
+              </a:spcBef>
+              <a:buNone/>
+              <a:defRPr sz="4400" kern="1200">
+                <a:solidFill>
+                  <a:schemeClr val="tx1"/>
+                </a:solidFill>
+                <a:latin typeface="+mj-lt"/>
+                <a:ea typeface="+mj-ea"/>
+                <a:cs typeface="+mj-cs"/>
+              </a:defRPr>
+            </a:lvl1pPr>
+          </a:lstStyle>
+          <a:p>
+            <a:r>
+              <a:rPr lang="zh-CN" altLang="en-US" sz="4000" b="1" dirty="0" smtClean="0">
+                <a:ln w="9525">
+                  <a:solidFill>
+                    <a:srgbClr val="FFFF00"/>
+                  </a:solidFill>
+                </a:ln>
+                <a:solidFill>
+                  <a:srgbClr val="002060"/>
+                </a:solidFill>
+                <a:effectLst>
+                  <a:outerShdw blurRad="38100" dist="38100" dir="2700000" algn="tl">
+                    <a:srgbClr val="000000">
+                      <a:alpha val="43137"/>
+                    </a:srgbClr>
+                  </a:outerShdw>
+                </a:effectLst>
+                <a:latin typeface="Microsoft JhengHei" pitchFamily="34" charset="-120"/>
+                <a:ea typeface="Microsoft JhengHei" pitchFamily="34" charset="-120"/>
+              </a:rPr>
+              <a:t>奇妙奇妙真奇妙</a:t>
+            </a:r>
+            <a:endParaRPr lang="en-US" sz="4000" b="1" dirty="0">
+              <a:ln w="9525">
+                <a:solidFill>
+                  <a:srgbClr val="FFFF00"/>
+                </a:solidFill>
+              </a:ln>
+              <a:solidFill>
+                <a:srgbClr val="002060"/>
+              </a:solidFill>
+              <a:effectLst>
+                <a:outerShdw blurRad="38100" dist="38100" dir="2700000" algn="tl">
+                  <a:srgbClr val="000000">
+                    <a:alpha val="43137"/>
+                  </a:srgbClr>
+                </a:outerShdw>
+              </a:effectLst>
+              <a:latin typeface="Microsoft JhengHei" pitchFamily="34" charset="-120"/>
+              <a:ea typeface="Microsoft JhengHei" pitchFamily="34" charset="-120"/>
+            </a:endParaRPr>
+          </a:p>
+        </p:txBody>
+      </p:sp>
+      <p:sp>
+        <p:nvSpPr>
+          <p:cNvPr id="5" name="Content Placeholder 2"/>
+          <p:cNvSpPr txBox="1">
+            <a:spLocks/>
+          </p:cNvSpPr>
+          <p:nvPr/>
+        </p:nvSpPr>
+        <p:spPr>
+          <a:xfrm>
+            <a:off x="7749" y="1123950"/>
+            <a:ext cx="9144000" cy="3394472"/>
+          </a:xfrm>
+          <a:prstGeom prst="rect">
+            <a:avLst/>
+          </a:prstGeom>
+        </p:spPr>
+        <p:txBody>
+          <a:bodyPr vert="horz" lIns="91440" tIns="45720" rIns="91440" bIns="45720" rtlCol="0">
+            <a:normAutofit/>
+          </a:bodyPr>
+          <a:lstStyle>
+            <a:lvl1pPr marL="342900" indent="-342900" algn="l" defTabSz="914400" rtl="0" eaLnBrk="1" latinLnBrk="0" hangingPunct="1">
+              <a:spcBef>
+                <a:spcPct val="20000"/>
+              </a:spcBef>
+              <a:buFont typeface="Arial" pitchFamily="34" charset="0"/>
+              <a:buChar char="•"/>
+              <a:defRPr sz="3200" kern="1200">
+                <a:solidFill>
+                  <a:schemeClr val="tx1"/>
+                </a:solidFill>
+                <a:latin typeface="+mn-lt"/>
+                <a:ea typeface="+mn-ea"/>
+                <a:cs typeface="+mn-cs"/>
+              </a:defRPr>
+            </a:lvl1pPr>
+            <a:lvl2pPr marL="742950" indent="-285750" algn="l" defTabSz="914400" rtl="0" eaLnBrk="1" latinLnBrk="0" hangingPunct="1">
+              <a:spcBef>
+                <a:spcPct val="20000"/>
+              </a:spcBef>
+              <a:buFont typeface="Arial" pitchFamily="34" charset="0"/>
+              <a:buChar char="–"/>
+              <a:defRPr sz="2800" kern="1200">
+                <a:solidFill>
+                  <a:schemeClr val="tx1"/>
+                </a:solidFill>
+                <a:latin typeface="+mn-lt"/>
+                <a:ea typeface="+mn-ea"/>
+                <a:cs typeface="+mn-cs"/>
+              </a:defRPr>
+            </a:lvl2pPr>
+            <a:lvl3pPr marL="1143000" indent="-228600" algn="l" defTabSz="914400" rtl="0" eaLnBrk="1" latinLnBrk="0" hangingPunct="1">
+              <a:spcBef>
+                <a:spcPct val="20000"/>
+              </a:spcBef>
+              <a:buFont typeface="Arial" pitchFamily="34" charset="0"/>
+              <a:buChar char="•"/>
+              <a:defRPr sz="2400" kern="1200">
+                <a:solidFill>
+                  <a:schemeClr val="tx1"/>
+                </a:solidFill>
+                <a:latin typeface="+mn-lt"/>
+                <a:ea typeface="+mn-ea"/>
+                <a:cs typeface="+mn-cs"/>
+              </a:defRPr>
+            </a:lvl3pPr>
+            <a:lvl4pPr marL="1600200" indent="-228600" algn="l" defTabSz="914400" rtl="0" eaLnBrk="1" latinLnBrk="0" hangingPunct="1">
+              <a:spcBef>
+                <a:spcPct val="20000"/>
+              </a:spcBef>
+              <a:buFont typeface="Arial" pitchFamily="34" charset="0"/>
+              <a:buChar char="–"/>
+              <a:defRPr sz="2000" kern="1200">
+                <a:solidFill>
+                  <a:schemeClr val="tx1"/>
+                </a:solidFill>
+                <a:latin typeface="+mn-lt"/>
+                <a:ea typeface="+mn-ea"/>
+                <a:cs typeface="+mn-cs"/>
+              </a:defRPr>
+            </a:lvl4pPr>
+            <a:lvl5pPr marL="2057400" indent="-228600" algn="l" defTabSz="914400" rtl="0" eaLnBrk="1" latinLnBrk="0" hangingPunct="1">
+              <a:spcBef>
+                <a:spcPct val="20000"/>
+              </a:spcBef>
+              <a:buFont typeface="Arial" pitchFamily="34" charset="0"/>
+              <a:buChar char="»"/>
+              <a:defRPr sz="2000" kern="1200">
+                <a:solidFill>
+                  <a:schemeClr val="tx1"/>
+                </a:solidFill>
+                <a:latin typeface="+mn-lt"/>
+                <a:ea typeface="+mn-ea"/>
+                <a:cs typeface="+mn-cs"/>
+              </a:defRPr>
+            </a:lvl5pPr>
+            <a:lvl6pPr marL="2514600" indent="-228600" algn="l" defTabSz="914400" rtl="0" eaLnBrk="1" latinLnBrk="0" hangingPunct="1">
+              <a:spcBef>
+                <a:spcPct val="20000"/>
+              </a:spcBef>
+              <a:buFont typeface="Arial" pitchFamily="34" charset="0"/>
+              <a:buChar char="•"/>
+              <a:defRPr sz="2000" kern="1200">
+                <a:solidFill>
+                  <a:schemeClr val="tx1"/>
+                </a:solidFill>
+                <a:latin typeface="+mn-lt"/>
+                <a:ea typeface="+mn-ea"/>
+                <a:cs typeface="+mn-cs"/>
+              </a:defRPr>
+            </a:lvl6pPr>
+            <a:lvl7pPr marL="2971800" indent="-228600" algn="l" defTabSz="914400" rtl="0" eaLnBrk="1" latinLnBrk="0" hangingPunct="1">
+              <a:spcBef>
+                <a:spcPct val="20000"/>
+              </a:spcBef>
+              <a:buFont typeface="Arial" pitchFamily="34" charset="0"/>
+              <a:buChar char="•"/>
+              <a:defRPr sz="2000" kern="1200">
+                <a:solidFill>
+                  <a:schemeClr val="tx1"/>
+                </a:solidFill>
+                <a:latin typeface="+mn-lt"/>
+                <a:ea typeface="+mn-ea"/>
+                <a:cs typeface="+mn-cs"/>
+              </a:defRPr>
+            </a:lvl7pPr>
+            <a:lvl8pPr marL="3429000" indent="-228600" algn="l" defTabSz="914400" rtl="0" eaLnBrk="1" latinLnBrk="0" hangingPunct="1">
+              <a:spcBef>
+                <a:spcPct val="20000"/>
+              </a:spcBef>
+              <a:buFont typeface="Arial" pitchFamily="34" charset="0"/>
+              <a:buChar char="•"/>
+              <a:defRPr sz="2000" kern="1200">
+                <a:solidFill>
+                  <a:schemeClr val="tx1"/>
+                </a:solidFill>
+                <a:latin typeface="+mn-lt"/>
+                <a:ea typeface="+mn-ea"/>
+                <a:cs typeface="+mn-cs"/>
+              </a:defRPr>
+            </a:lvl8pPr>
+            <a:lvl9pPr marL="3886200" indent="-228600" algn="l" defTabSz="914400" rtl="0" eaLnBrk="1" latinLnBrk="0" hangingPunct="1">
+              <a:spcBef>
+                <a:spcPct val="20000"/>
+              </a:spcBef>
+              <a:buFont typeface="Arial" pitchFamily="34" charset="0"/>
+              <a:buChar char="•"/>
+              <a:defRPr sz="2000" kern="1200">
+                <a:solidFill>
+                  <a:schemeClr val="tx1"/>
+                </a:solidFill>
+                <a:latin typeface="+mn-lt"/>
+                <a:ea typeface="+mn-ea"/>
+                <a:cs typeface="+mn-cs"/>
+              </a:defRPr>
+            </a:lvl9pPr>
+          </a:lstStyle>
+          <a:p>
+            <a:pPr marL="0" indent="0" algn="ctr">
+              <a:buFont typeface="Arial" pitchFamily="34" charset="0"/>
+              <a:buNone/>
+            </a:pPr>
+            <a:r>
+              <a:rPr lang="zh-CN" altLang="en-US" sz="4400" b="1" dirty="0" smtClean="0">
+                <a:ln w="9525">
+                  <a:solidFill>
+                    <a:srgbClr val="FFFF00"/>
+                  </a:solidFill>
+                </a:ln>
+                <a:solidFill>
+                  <a:srgbClr val="002060"/>
+                </a:solidFill>
+                <a:effectLst>
+                  <a:outerShdw blurRad="38100" dist="38100" dir="2700000" algn="tl">
+                    <a:srgbClr val="000000">
+                      <a:alpha val="43137"/>
+                    </a:srgbClr>
+                  </a:outerShdw>
+                </a:effectLst>
+                <a:latin typeface="Microsoft JhengHei" pitchFamily="34" charset="-120"/>
+                <a:ea typeface="Microsoft JhengHei" pitchFamily="34" charset="-120"/>
+              </a:rPr>
+              <a:t>奇妙奇妙真奇妙  一隻毛蟲變蝴蝶</a:t>
+            </a:r>
+            <a:endParaRPr lang="en-US" altLang="zh-CN" sz="4400" b="1" dirty="0" smtClean="0">
+              <a:ln w="9525">
+                <a:solidFill>
+                  <a:srgbClr val="FFFF00"/>
+                </a:solidFill>
+              </a:ln>
+              <a:solidFill>
+                <a:srgbClr val="002060"/>
+              </a:solidFill>
+              <a:effectLst>
+                <a:outerShdw blurRad="38100" dist="38100" dir="2700000" algn="tl">
+                  <a:srgbClr val="000000">
+                    <a:alpha val="43137"/>
+                  </a:srgbClr>
+                </a:outerShdw>
+              </a:effectLst>
+              <a:latin typeface="Microsoft JhengHei" pitchFamily="34" charset="-120"/>
+              <a:ea typeface="Microsoft JhengHei" pitchFamily="34" charset="-120"/>
+            </a:endParaRPr>
+          </a:p>
+          <a:p>
+            <a:pPr marL="0" indent="0" algn="ctr">
+              <a:buFont typeface="Arial" pitchFamily="34" charset="0"/>
+              <a:buNone/>
+            </a:pPr>
+            <a:r>
+              <a:rPr lang="zh-CN" altLang="en-US" sz="4400" b="1" dirty="0" smtClean="0">
+                <a:ln w="9525">
+                  <a:solidFill>
+                    <a:srgbClr val="FFFF00"/>
+                  </a:solidFill>
+                </a:ln>
+                <a:solidFill>
+                  <a:srgbClr val="002060"/>
+                </a:solidFill>
+                <a:effectLst>
+                  <a:outerShdw blurRad="38100" dist="38100" dir="2700000" algn="tl">
+                    <a:srgbClr val="000000">
+                      <a:alpha val="43137"/>
+                    </a:srgbClr>
+                  </a:outerShdw>
+                </a:effectLst>
+                <a:latin typeface="Microsoft JhengHei" pitchFamily="34" charset="-120"/>
+                <a:ea typeface="Microsoft JhengHei" pitchFamily="34" charset="-120"/>
+              </a:rPr>
+              <a:t>奇妙奇妙真奇妙  一粒種子變大樹</a:t>
+            </a:r>
+            <a:endParaRPr lang="en-US" altLang="zh-CN" sz="4400" b="1" dirty="0" smtClean="0">
+              <a:ln w="9525">
+                <a:solidFill>
+                  <a:srgbClr val="FFFF00"/>
+                </a:solidFill>
+              </a:ln>
+              <a:solidFill>
+                <a:srgbClr val="002060"/>
+              </a:solidFill>
+              <a:effectLst>
+                <a:outerShdw blurRad="38100" dist="38100" dir="2700000" algn="tl">
+                  <a:srgbClr val="000000">
+                    <a:alpha val="43137"/>
+                  </a:srgbClr>
+                </a:outerShdw>
+              </a:effectLst>
+              <a:latin typeface="Microsoft JhengHei" pitchFamily="34" charset="-120"/>
+              <a:ea typeface="Microsoft JhengHei" pitchFamily="34" charset="-120"/>
+            </a:endParaRPr>
+          </a:p>
+          <a:p>
+            <a:pPr marL="0" indent="0" algn="ctr">
+              <a:buFont typeface="Arial" pitchFamily="34" charset="0"/>
+              <a:buNone/>
+            </a:pPr>
+            <a:r>
+              <a:rPr lang="zh-CN" altLang="en-US" sz="4400" b="1" dirty="0" smtClean="0">
+                <a:ln w="9525">
+                  <a:solidFill>
+                    <a:srgbClr val="FFFF00"/>
+                  </a:solidFill>
+                </a:ln>
+                <a:solidFill>
+                  <a:srgbClr val="002060"/>
+                </a:solidFill>
+                <a:effectLst>
+                  <a:outerShdw blurRad="38100" dist="38100" dir="2700000" algn="tl">
+                    <a:srgbClr val="000000">
+                      <a:alpha val="43137"/>
+                    </a:srgbClr>
+                  </a:outerShdw>
+                </a:effectLst>
+                <a:latin typeface="Microsoft JhengHei" pitchFamily="34" charset="-120"/>
+                <a:ea typeface="Microsoft JhengHei" pitchFamily="34" charset="-120"/>
+              </a:rPr>
+              <a:t>耶穌寶血有能力  使我罪人得生命</a:t>
+            </a:r>
+            <a:endParaRPr lang="en-US" altLang="zh-CN" sz="4400" b="1" dirty="0" smtClean="0">
+              <a:ln w="9525">
+                <a:solidFill>
+                  <a:srgbClr val="FFFF00"/>
+                </a:solidFill>
+              </a:ln>
+              <a:solidFill>
+                <a:srgbClr val="002060"/>
+              </a:solidFill>
+              <a:effectLst>
+                <a:outerShdw blurRad="38100" dist="38100" dir="2700000" algn="tl">
+                  <a:srgbClr val="000000">
+                    <a:alpha val="43137"/>
+                  </a:srgbClr>
+                </a:outerShdw>
+              </a:effectLst>
+              <a:latin typeface="Microsoft JhengHei" pitchFamily="34" charset="-120"/>
+              <a:ea typeface="Microsoft JhengHei" pitchFamily="34" charset="-120"/>
+            </a:endParaRPr>
+          </a:p>
+          <a:p>
+            <a:pPr marL="0" indent="0" algn="ctr">
+              <a:buFont typeface="Arial" pitchFamily="34" charset="0"/>
+              <a:buNone/>
+            </a:pPr>
+            <a:r>
+              <a:rPr lang="zh-CN" altLang="en-US" sz="4400" b="1" dirty="0" smtClean="0">
+                <a:ln w="9525">
+                  <a:solidFill>
+                    <a:srgbClr val="FFFF00"/>
+                  </a:solidFill>
+                </a:ln>
+                <a:solidFill>
+                  <a:srgbClr val="002060"/>
+                </a:solidFill>
+                <a:effectLst>
+                  <a:outerShdw blurRad="38100" dist="38100" dir="2700000" algn="tl">
+                    <a:srgbClr val="000000">
+                      <a:alpha val="43137"/>
+                    </a:srgbClr>
+                  </a:outerShdw>
+                </a:effectLst>
+                <a:latin typeface="Microsoft JhengHei" pitchFamily="34" charset="-120"/>
+                <a:ea typeface="Microsoft JhengHei" pitchFamily="34" charset="-120"/>
+              </a:rPr>
+              <a:t>奇妙奇妙真奇妙  一個舊人變新人</a:t>
+            </a:r>
+            <a:endParaRPr lang="en-US" sz="4400" b="1" dirty="0">
+              <a:ln w="9525">
+                <a:solidFill>
+                  <a:srgbClr val="FFFF00"/>
+                </a:solidFill>
+              </a:ln>
+              <a:solidFill>
+                <a:srgbClr val="002060"/>
+              </a:solidFill>
+              <a:effectLst>
+                <a:outerShdw blurRad="38100" dist="38100" dir="2700000" algn="tl">
+                  <a:srgbClr val="000000">
+                    <a:alpha val="43137"/>
+                  </a:srgbClr>
+                </a:outerShdw>
+              </a:effectLst>
+              <a:latin typeface="Microsoft JhengHei" pitchFamily="34" charset="-120"/>
+              <a:ea typeface="Microsoft JhengHei" pitchFamily="34" charset="-120"/>
+            </a:endParaRPr>
+          </a:p>
+        </p:txBody>
+      </p:sp>
+    </p:spTree>
+    <p:extLst>
+      <p:ext uri="{BB962C8B-B14F-4D97-AF65-F5344CB8AC3E}">
+        <p14:creationId xmlns:p14="http://schemas.microsoft.com/office/powerpoint/2010/main" val="4264188724"/>
+      </p:ext>
+    </p:extLst>
+  </p:cSld>
+  <p:clrMapOvr>
+    <a:masterClrMapping/>
+  </p:clrMapOvr>
+</p:sld>
+</file>
+
+<file path=ppt/slides/slide3.xml><?xml version="1.0" encoding="utf-8"?>
 <p:sld xmlns:a="http://schemas.openxmlformats.org/drawingml/2006/main" xmlns:r="http://schemas.openxmlformats.org/officeDocument/2006/relationships" xmlns:p="http://schemas.openxmlformats.org/presentationml/2006/main">
   <p:cSld>
     <p:spTree>

</xml_diff>